<commit_message>
БП + new Pres
</commit_message>
<xml_diff>
--- a/k224-docs/Servis_po_organizatsii_i_poisku_meropriaty_Par.pptx
+++ b/k224-docs/Servis_po_organizatsii_i_poisku_meropriaty_Par.pptx
@@ -26,8 +26,8 @@
     <p:sldId id="284" r:id="rId15"/>
     <p:sldId id="277" r:id="rId16"/>
     <p:sldId id="275" r:id="rId17"/>
-    <p:sldId id="276" r:id="rId18"/>
-    <p:sldId id="282" r:id="rId19"/>
+    <p:sldId id="282" r:id="rId18"/>
+    <p:sldId id="276" r:id="rId19"/>
     <p:sldId id="281" r:id="rId20"/>
     <p:sldId id="259" r:id="rId21"/>
     <p:sldId id="260" r:id="rId22"/>
@@ -383,11 +383,11 @@
         </c:dLbls>
         <c:marker val="1"/>
         <c:smooth val="0"/>
-        <c:axId val="257086888"/>
-        <c:axId val="257085712"/>
+        <c:axId val="252846784"/>
+        <c:axId val="252851880"/>
       </c:lineChart>
       <c:dateAx>
-        <c:axId val="257086888"/>
+        <c:axId val="252846784"/>
         <c:scaling>
           <c:orientation val="minMax"/>
         </c:scaling>
@@ -427,14 +427,14 @@
             <a:endParaRPr lang="ru-RU"/>
           </a:p>
         </c:txPr>
-        <c:crossAx val="257085712"/>
+        <c:crossAx val="252851880"/>
         <c:crosses val="autoZero"/>
         <c:auto val="1"/>
         <c:lblOffset val="100"/>
         <c:baseTimeUnit val="days"/>
       </c:dateAx>
       <c:valAx>
-        <c:axId val="257085712"/>
+        <c:axId val="252851880"/>
         <c:scaling>
           <c:orientation val="minMax"/>
         </c:scaling>
@@ -455,6 +455,29 @@
           </c:spPr>
         </c:majorGridlines>
         <c:title>
+          <c:tx>
+            <c:rich>
+              <a:bodyPr rot="-5400000" spcFirstLastPara="1" vertOverflow="ellipsis" vert="horz" wrap="square" anchor="ctr" anchorCtr="1"/>
+              <a:lstStyle/>
+              <a:p>
+                <a:pPr algn="ctr" rtl="0">
+                  <a:defRPr lang="ru-RU" sz="1200" b="0" i="0" u="none" strike="noStrike" kern="1200" spc="0" baseline="0">
+                    <a:solidFill>
+                      <a:schemeClr val="tx1"/>
+                    </a:solidFill>
+                    <a:latin typeface="+mn-lt"/>
+                    <a:ea typeface="+mn-ea"/>
+                    <a:cs typeface="+mn-cs"/>
+                  </a:defRPr>
+                </a:pPr>
+                <a:r>
+                  <a:rPr lang="ru-RU" dirty="0" smtClean="0"/>
+                  <a:t>Номер версии</a:t>
+                </a:r>
+                <a:endParaRPr lang="ru-RU" dirty="0"/>
+              </a:p>
+            </c:rich>
+          </c:tx>
           <c:layout/>
           <c:overlay val="0"/>
           <c:spPr>
@@ -510,7 +533,7 @@
             <a:endParaRPr lang="ru-RU"/>
           </a:p>
         </c:txPr>
-        <c:crossAx val="257086888"/>
+        <c:crossAx val="252846784"/>
         <c:crosses val="autoZero"/>
         <c:crossBetween val="between"/>
       </c:valAx>
@@ -602,7 +625,6 @@
   </mc:AlternateContent>
   <c:chart>
     <c:title>
-      <c:layout/>
       <c:overlay val="0"/>
       <c:spPr>
         <a:noFill/>
@@ -1295,11 +1317,11 @@
         </c:dLbls>
         <c:gapWidth val="100"/>
         <c:overlap val="-24"/>
-        <c:axId val="260081080"/>
-        <c:axId val="260079904"/>
+        <c:axId val="295858528"/>
+        <c:axId val="295859704"/>
       </c:barChart>
       <c:catAx>
-        <c:axId val="260081080"/>
+        <c:axId val="295858528"/>
         <c:scaling>
           <c:orientation val="minMax"/>
         </c:scaling>
@@ -1339,7 +1361,7 @@
             <a:endParaRPr lang="ru-RU"/>
           </a:p>
         </c:txPr>
-        <c:crossAx val="260079904"/>
+        <c:crossAx val="295859704"/>
         <c:crosses val="autoZero"/>
         <c:auto val="1"/>
         <c:lblAlgn val="ctr"/>
@@ -1347,7 +1369,7 @@
         <c:noMultiLvlLbl val="0"/>
       </c:catAx>
       <c:valAx>
-        <c:axId val="260079904"/>
+        <c:axId val="295859704"/>
         <c:scaling>
           <c:orientation val="minMax"/>
         </c:scaling>
@@ -1395,7 +1417,7 @@
             <a:endParaRPr lang="ru-RU"/>
           </a:p>
         </c:txPr>
-        <c:crossAx val="260081080"/>
+        <c:crossAx val="295858528"/>
         <c:crosses val="autoZero"/>
         <c:crossBetween val="between"/>
       </c:valAx>
@@ -6615,45 +6637,45 @@
     </dgm:pt>
   </dgm:ptLst>
   <dgm:cxnLst>
-    <dgm:cxn modelId="{32D9F149-C2A1-4DD8-A69C-877BCA8D5EDD}" type="presOf" srcId="{FAAD98B4-2CE9-4214-8BB6-F03CEEE572FF}" destId="{38CD6BD6-D3E2-4B97-8665-48065905F491}" srcOrd="1" destOrd="2" presId="urn:microsoft.com/office/officeart/2005/8/layout/cycle4"/>
+    <dgm:cxn modelId="{6380C4C7-4EBB-43A2-9301-54A5C9841434}" type="presOf" srcId="{FAAD98B4-2CE9-4214-8BB6-F03CEEE572FF}" destId="{4D58B8E3-ABF3-466F-BE72-A1334046C3F4}" srcOrd="0" destOrd="2" presId="urn:microsoft.com/office/officeart/2005/8/layout/cycle4"/>
+    <dgm:cxn modelId="{5900A8BD-7DF5-411F-BDC8-2899BCECAF71}" type="presOf" srcId="{2BFBAB07-2C4C-4FAB-9052-FFD3F4A28A9E}" destId="{C05EAFFC-2644-44E2-967D-B53235C71A38}" srcOrd="1" destOrd="1" presId="urn:microsoft.com/office/officeart/2005/8/layout/cycle4"/>
+    <dgm:cxn modelId="{9BF38558-2481-46D5-AB3E-FC48BBE62666}" srcId="{F9BE74C9-EC7E-4268-8C5A-882B3EFFF8FD}" destId="{E5ACC793-F455-4177-B2A7-6FC33C9C1025}" srcOrd="3" destOrd="0" parTransId="{F3D91DD1-F12E-4C5D-82CF-86CF95B338AA}" sibTransId="{0E3913D7-3C7B-49AF-9134-A90315714B9E}"/>
+    <dgm:cxn modelId="{7F659E51-2E2F-40FF-9479-2FD7E732DF62}" type="presOf" srcId="{2D6962E4-72B9-4B1E-B258-246893A88E0D}" destId="{60DA8870-9857-4057-BC91-DD9B798F041F}" srcOrd="0" destOrd="0" presId="urn:microsoft.com/office/officeart/2005/8/layout/cycle4"/>
+    <dgm:cxn modelId="{9991E351-28AB-47A6-8963-A9D299DB8675}" type="presOf" srcId="{989E09AB-A343-466C-BC14-C765FC9A1DD7}" destId="{4D58B8E3-ABF3-466F-BE72-A1334046C3F4}" srcOrd="0" destOrd="1" presId="urn:microsoft.com/office/officeart/2005/8/layout/cycle4"/>
+    <dgm:cxn modelId="{CB0B1B1A-10F9-41F1-A66F-C247C25FE7E2}" type="presOf" srcId="{618CC25E-9050-4FB6-9F11-CAFC660578FC}" destId="{382DE9F5-C159-437A-AA3E-CE93A76C5FDC}" srcOrd="0" destOrd="0" presId="urn:microsoft.com/office/officeart/2005/8/layout/cycle4"/>
     <dgm:cxn modelId="{32486DDC-2E79-4178-8461-4BC45C795BB2}" srcId="{01A583E1-6537-45F8-AE09-C85491C9FC1D}" destId="{F9BE74C9-EC7E-4268-8C5A-882B3EFFF8FD}" srcOrd="3" destOrd="0" parTransId="{EA0E44FE-C617-463A-B76E-A9DC58753A03}" sibTransId="{0967E1B8-BCB6-4EBC-AE86-D9382359FC3F}"/>
-    <dgm:cxn modelId="{CB0B1B1A-10F9-41F1-A66F-C247C25FE7E2}" type="presOf" srcId="{618CC25E-9050-4FB6-9F11-CAFC660578FC}" destId="{382DE9F5-C159-437A-AA3E-CE93A76C5FDC}" srcOrd="0" destOrd="0" presId="urn:microsoft.com/office/officeart/2005/8/layout/cycle4"/>
-    <dgm:cxn modelId="{6F2C1348-DD44-4E86-9478-89C1CF069569}" srcId="{01A583E1-6537-45F8-AE09-C85491C9FC1D}" destId="{2BBE2155-4658-4D02-8319-6DF4106EA8CC}" srcOrd="1" destOrd="0" parTransId="{3724DD7C-05CC-4DEB-8DAD-8B592C981C96}" sibTransId="{632890C8-ECA2-44D8-9A94-863A64665BBC}"/>
+    <dgm:cxn modelId="{EDDAA38D-6E30-4543-B0F1-EAA9A6A477C7}" srcId="{01A583E1-6537-45F8-AE09-C85491C9FC1D}" destId="{2D6962E4-72B9-4B1E-B258-246893A88E0D}" srcOrd="0" destOrd="0" parTransId="{5502C073-0884-4CFE-A849-62990833CEE5}" sibTransId="{0E9043AA-3D92-4FE3-8FA8-E174F20EB8FF}"/>
+    <dgm:cxn modelId="{DE7E25E1-0419-411E-8CE9-67B65CD394AF}" type="presOf" srcId="{7095E70B-7EFB-4733-BA44-C4BB0599979F}" destId="{38CD6BD6-D3E2-4B97-8665-48065905F491}" srcOrd="1" destOrd="3" presId="urn:microsoft.com/office/officeart/2005/8/layout/cycle4"/>
+    <dgm:cxn modelId="{0867E0A3-B749-4FC7-AFD8-611582642A56}" srcId="{5BCD62D5-23CD-4A5A-A476-269CE76914DC}" destId="{618CC25E-9050-4FB6-9F11-CAFC660578FC}" srcOrd="0" destOrd="0" parTransId="{892FDF72-278A-4E94-A52C-C9A43137F613}" sibTransId="{E48127D6-89B0-4F87-A1F9-517011A96A5B}"/>
+    <dgm:cxn modelId="{EDA00CFB-CF50-47D2-9DB9-9D5DE58CAD7E}" srcId="{2D6962E4-72B9-4B1E-B258-246893A88E0D}" destId="{989E09AB-A343-466C-BC14-C765FC9A1DD7}" srcOrd="1" destOrd="0" parTransId="{288B4C8E-3DA7-4373-926B-0E2EBA929F32}" sibTransId="{FB5D77EC-83C1-4323-ACE4-4842959B2E06}"/>
+    <dgm:cxn modelId="{5474BC8E-7785-4D13-A4F3-61EF990ED269}" type="presOf" srcId="{F8507812-6291-4C9B-AA0B-B8AF3A68427D}" destId="{22A0A0BC-6367-462E-93A8-CA8C46FCDCA0}" srcOrd="0" destOrd="2" presId="urn:microsoft.com/office/officeart/2005/8/layout/cycle4"/>
+    <dgm:cxn modelId="{41218EDB-BD90-4410-89D0-F42795B77442}" type="presOf" srcId="{F9BE74C9-EC7E-4268-8C5A-882B3EFFF8FD}" destId="{809A40DB-630A-4CA0-804D-1A67767C019F}" srcOrd="0" destOrd="0" presId="urn:microsoft.com/office/officeart/2005/8/layout/cycle4"/>
+    <dgm:cxn modelId="{7647034C-6B12-4E3A-BEA0-6005F318DA9E}" type="presOf" srcId="{490168AD-E14E-4940-8CC2-7C35F66AB41B}" destId="{BD656469-D70B-4710-B138-3ED38F1BD8E1}" srcOrd="1" destOrd="0" presId="urn:microsoft.com/office/officeart/2005/8/layout/cycle4"/>
+    <dgm:cxn modelId="{C729B709-07FE-42F4-AAEB-B07A501F7CBF}" type="presOf" srcId="{2BBE2155-4658-4D02-8319-6DF4106EA8CC}" destId="{147178AE-0CD4-4FA3-A352-95F7DEF02040}" srcOrd="0" destOrd="0" presId="urn:microsoft.com/office/officeart/2005/8/layout/cycle4"/>
+    <dgm:cxn modelId="{E4D73487-C5B1-4EB2-AF38-71DF0EBFDB67}" type="presOf" srcId="{7095E70B-7EFB-4733-BA44-C4BB0599979F}" destId="{4D58B8E3-ABF3-466F-BE72-A1334046C3F4}" srcOrd="0" destOrd="3" presId="urn:microsoft.com/office/officeart/2005/8/layout/cycle4"/>
+    <dgm:cxn modelId="{4665B531-CE39-4D8D-9C92-1B0A97DBEF06}" srcId="{2BBE2155-4658-4D02-8319-6DF4106EA8CC}" destId="{490168AD-E14E-4940-8CC2-7C35F66AB41B}" srcOrd="0" destOrd="0" parTransId="{F8E86141-CA5C-4FD7-B090-BDC097EE9ED9}" sibTransId="{409F351B-3747-4E3C-89C6-F2C76F7C931A}"/>
+    <dgm:cxn modelId="{1695E917-4CB0-460A-9E6B-4DF46E74DE66}" type="presOf" srcId="{490168AD-E14E-4940-8CC2-7C35F66AB41B}" destId="{53094224-E102-4C09-9604-A3E90CFD0EB5}" srcOrd="0" destOrd="0" presId="urn:microsoft.com/office/officeart/2005/8/layout/cycle4"/>
+    <dgm:cxn modelId="{DCB35549-6653-457E-A1A3-3F1DB9F48EB2}" srcId="{F9BE74C9-EC7E-4268-8C5A-882B3EFFF8FD}" destId="{F8507812-6291-4C9B-AA0B-B8AF3A68427D}" srcOrd="2" destOrd="0" parTransId="{4F2F02B6-C766-433A-873A-91091688269D}" sibTransId="{380A3AC5-BB38-4979-8AA3-011E077F4CA2}"/>
+    <dgm:cxn modelId="{784002D3-341F-4DF0-9345-0B1634589798}" type="presOf" srcId="{2B41BF75-F5C8-4255-892F-6328E5A9E688}" destId="{38CD6BD6-D3E2-4B97-8665-48065905F491}" srcOrd="1" destOrd="0" presId="urn:microsoft.com/office/officeart/2005/8/layout/cycle4"/>
     <dgm:cxn modelId="{00B4959F-898B-4380-9C95-B6E29A75A95C}" type="presOf" srcId="{618CC25E-9050-4FB6-9F11-CAFC660578FC}" destId="{7BE406E3-09FD-43B4-AAF9-51FAB58146A3}" srcOrd="1" destOrd="0" presId="urn:microsoft.com/office/officeart/2005/8/layout/cycle4"/>
-    <dgm:cxn modelId="{02D76481-2E62-4BA9-9F42-AE33CB3B6F3E}" type="presOf" srcId="{E5ACC793-F455-4177-B2A7-6FC33C9C1025}" destId="{C05EAFFC-2644-44E2-967D-B53235C71A38}" srcOrd="1" destOrd="3" presId="urn:microsoft.com/office/officeart/2005/8/layout/cycle4"/>
-    <dgm:cxn modelId="{5900A8BD-7DF5-411F-BDC8-2899BCECAF71}" type="presOf" srcId="{2BFBAB07-2C4C-4FAB-9052-FFD3F4A28A9E}" destId="{C05EAFFC-2644-44E2-967D-B53235C71A38}" srcOrd="1" destOrd="1" presId="urn:microsoft.com/office/officeart/2005/8/layout/cycle4"/>
-    <dgm:cxn modelId="{EDA00CFB-CF50-47D2-9DB9-9D5DE58CAD7E}" srcId="{2D6962E4-72B9-4B1E-B258-246893A88E0D}" destId="{989E09AB-A343-466C-BC14-C765FC9A1DD7}" srcOrd="1" destOrd="0" parTransId="{288B4C8E-3DA7-4373-926B-0E2EBA929F32}" sibTransId="{FB5D77EC-83C1-4323-ACE4-4842959B2E06}"/>
-    <dgm:cxn modelId="{F41F6067-9583-4D97-9E45-7AAACB397DC1}" srcId="{01A583E1-6537-45F8-AE09-C85491C9FC1D}" destId="{5BCD62D5-23CD-4A5A-A476-269CE76914DC}" srcOrd="2" destOrd="0" parTransId="{C274F423-C9C0-423A-80FB-84C18F1C3BA8}" sibTransId="{6CCF063A-E379-49B3-9CC0-57BB9F2B8432}"/>
-    <dgm:cxn modelId="{67308CEA-9FD1-426E-BDAA-B330570BC27C}" type="presOf" srcId="{23580231-228D-4259-948C-ECAED9FB6BBD}" destId="{22A0A0BC-6367-462E-93A8-CA8C46FCDCA0}" srcOrd="0" destOrd="0" presId="urn:microsoft.com/office/officeart/2005/8/layout/cycle4"/>
-    <dgm:cxn modelId="{DE7E25E1-0419-411E-8CE9-67B65CD394AF}" type="presOf" srcId="{7095E70B-7EFB-4733-BA44-C4BB0599979F}" destId="{38CD6BD6-D3E2-4B97-8665-48065905F491}" srcOrd="1" destOrd="3" presId="urn:microsoft.com/office/officeart/2005/8/layout/cycle4"/>
-    <dgm:cxn modelId="{C729B709-07FE-42F4-AAEB-B07A501F7CBF}" type="presOf" srcId="{2BBE2155-4658-4D02-8319-6DF4106EA8CC}" destId="{147178AE-0CD4-4FA3-A352-95F7DEF02040}" srcOrd="0" destOrd="0" presId="urn:microsoft.com/office/officeart/2005/8/layout/cycle4"/>
+    <dgm:cxn modelId="{5BB7FEFC-FF0F-40F9-85B4-B338B4BD98A3}" srcId="{F9BE74C9-EC7E-4268-8C5A-882B3EFFF8FD}" destId="{23580231-228D-4259-948C-ECAED9FB6BBD}" srcOrd="0" destOrd="0" parTransId="{CB1BEA55-1E25-49B4-8245-B386B1EBDAB7}" sibTransId="{EF2DA803-88D8-4CC3-A191-D63C166FB7FF}"/>
+    <dgm:cxn modelId="{9BAD8EFF-9B32-4433-B605-9BFDB094AF74}" type="presOf" srcId="{989E09AB-A343-466C-BC14-C765FC9A1DD7}" destId="{38CD6BD6-D3E2-4B97-8665-48065905F491}" srcOrd="1" destOrd="1" presId="urn:microsoft.com/office/officeart/2005/8/layout/cycle4"/>
     <dgm:cxn modelId="{25B6265F-DE51-4D72-88A4-F99F10356E86}" srcId="{F9BE74C9-EC7E-4268-8C5A-882B3EFFF8FD}" destId="{2BFBAB07-2C4C-4FAB-9052-FFD3F4A28A9E}" srcOrd="1" destOrd="0" parTransId="{40C55B56-8FA6-4369-9144-9E433D309CBB}" sibTransId="{7A024E95-77FA-4074-8271-31A91DA4713B}"/>
-    <dgm:cxn modelId="{7647034C-6B12-4E3A-BEA0-6005F318DA9E}" type="presOf" srcId="{490168AD-E14E-4940-8CC2-7C35F66AB41B}" destId="{BD656469-D70B-4710-B138-3ED38F1BD8E1}" srcOrd="1" destOrd="0" presId="urn:microsoft.com/office/officeart/2005/8/layout/cycle4"/>
+    <dgm:cxn modelId="{1C4B7B5B-5A26-4FB7-B7A4-76D489C60865}" srcId="{2D6962E4-72B9-4B1E-B258-246893A88E0D}" destId="{FAAD98B4-2CE9-4214-8BB6-F03CEEE572FF}" srcOrd="2" destOrd="0" parTransId="{54D2E552-AFA4-449B-855C-8D07B27E44E2}" sibTransId="{CBB1F48E-041C-465A-B96F-A59A0B7362A5}"/>
     <dgm:cxn modelId="{4EB1F7F9-51B7-4A9C-B2E8-B495495CB616}" type="presOf" srcId="{2BFBAB07-2C4C-4FAB-9052-FFD3F4A28A9E}" destId="{22A0A0BC-6367-462E-93A8-CA8C46FCDCA0}" srcOrd="0" destOrd="1" presId="urn:microsoft.com/office/officeart/2005/8/layout/cycle4"/>
     <dgm:cxn modelId="{5B1285C2-C638-4E1D-9B5F-9E11AB797450}" type="presOf" srcId="{E5ACC793-F455-4177-B2A7-6FC33C9C1025}" destId="{22A0A0BC-6367-462E-93A8-CA8C46FCDCA0}" srcOrd="0" destOrd="3" presId="urn:microsoft.com/office/officeart/2005/8/layout/cycle4"/>
-    <dgm:cxn modelId="{5474BC8E-7785-4D13-A4F3-61EF990ED269}" type="presOf" srcId="{F8507812-6291-4C9B-AA0B-B8AF3A68427D}" destId="{22A0A0BC-6367-462E-93A8-CA8C46FCDCA0}" srcOrd="0" destOrd="2" presId="urn:microsoft.com/office/officeart/2005/8/layout/cycle4"/>
+    <dgm:cxn modelId="{32D9F149-C2A1-4DD8-A69C-877BCA8D5EDD}" type="presOf" srcId="{FAAD98B4-2CE9-4214-8BB6-F03CEEE572FF}" destId="{38CD6BD6-D3E2-4B97-8665-48065905F491}" srcOrd="1" destOrd="2" presId="urn:microsoft.com/office/officeart/2005/8/layout/cycle4"/>
+    <dgm:cxn modelId="{3C16332A-B919-432D-BF91-AC79BAB354ED}" type="presOf" srcId="{01A583E1-6537-45F8-AE09-C85491C9FC1D}" destId="{9D4C7C9D-7ED1-464F-941B-21AB88CE8789}" srcOrd="0" destOrd="0" presId="urn:microsoft.com/office/officeart/2005/8/layout/cycle4"/>
+    <dgm:cxn modelId="{67308CEA-9FD1-426E-BDAA-B330570BC27C}" type="presOf" srcId="{23580231-228D-4259-948C-ECAED9FB6BBD}" destId="{22A0A0BC-6367-462E-93A8-CA8C46FCDCA0}" srcOrd="0" destOrd="0" presId="urn:microsoft.com/office/officeart/2005/8/layout/cycle4"/>
+    <dgm:cxn modelId="{06428E54-26A5-4289-B287-166FC667611C}" type="presOf" srcId="{23580231-228D-4259-948C-ECAED9FB6BBD}" destId="{C05EAFFC-2644-44E2-967D-B53235C71A38}" srcOrd="1" destOrd="0" presId="urn:microsoft.com/office/officeart/2005/8/layout/cycle4"/>
+    <dgm:cxn modelId="{4E151F0E-C99E-4BF4-81BC-837B231CBF92}" type="presOf" srcId="{2B41BF75-F5C8-4255-892F-6328E5A9E688}" destId="{4D58B8E3-ABF3-466F-BE72-A1334046C3F4}" srcOrd="0" destOrd="0" presId="urn:microsoft.com/office/officeart/2005/8/layout/cycle4"/>
+    <dgm:cxn modelId="{02D76481-2E62-4BA9-9F42-AE33CB3B6F3E}" type="presOf" srcId="{E5ACC793-F455-4177-B2A7-6FC33C9C1025}" destId="{C05EAFFC-2644-44E2-967D-B53235C71A38}" srcOrd="1" destOrd="3" presId="urn:microsoft.com/office/officeart/2005/8/layout/cycle4"/>
+    <dgm:cxn modelId="{F41F6067-9583-4D97-9E45-7AAACB397DC1}" srcId="{01A583E1-6537-45F8-AE09-C85491C9FC1D}" destId="{5BCD62D5-23CD-4A5A-A476-269CE76914DC}" srcOrd="2" destOrd="0" parTransId="{C274F423-C9C0-423A-80FB-84C18F1C3BA8}" sibTransId="{6CCF063A-E379-49B3-9CC0-57BB9F2B8432}"/>
+    <dgm:cxn modelId="{B55F96D7-8D63-46D6-833C-7BB32A8BF044}" type="presOf" srcId="{F8507812-6291-4C9B-AA0B-B8AF3A68427D}" destId="{C05EAFFC-2644-44E2-967D-B53235C71A38}" srcOrd="1" destOrd="2" presId="urn:microsoft.com/office/officeart/2005/8/layout/cycle4"/>
     <dgm:cxn modelId="{C1CC8C5E-8C3B-4002-B283-DDF651B9C2DF}" srcId="{2D6962E4-72B9-4B1E-B258-246893A88E0D}" destId="{7095E70B-7EFB-4733-BA44-C4BB0599979F}" srcOrd="3" destOrd="0" parTransId="{64A1E298-33AE-4CD3-B3E0-AF77857653AE}" sibTransId="{BBF2356D-3C61-41D3-A629-D15BD788173A}"/>
-    <dgm:cxn modelId="{3C16332A-B919-432D-BF91-AC79BAB354ED}" type="presOf" srcId="{01A583E1-6537-45F8-AE09-C85491C9FC1D}" destId="{9D4C7C9D-7ED1-464F-941B-21AB88CE8789}" srcOrd="0" destOrd="0" presId="urn:microsoft.com/office/officeart/2005/8/layout/cycle4"/>
-    <dgm:cxn modelId="{5BB7FEFC-FF0F-40F9-85B4-B338B4BD98A3}" srcId="{F9BE74C9-EC7E-4268-8C5A-882B3EFFF8FD}" destId="{23580231-228D-4259-948C-ECAED9FB6BBD}" srcOrd="0" destOrd="0" parTransId="{CB1BEA55-1E25-49B4-8245-B386B1EBDAB7}" sibTransId="{EF2DA803-88D8-4CC3-A191-D63C166FB7FF}"/>
+    <dgm:cxn modelId="{6F2C1348-DD44-4E86-9478-89C1CF069569}" srcId="{01A583E1-6537-45F8-AE09-C85491C9FC1D}" destId="{2BBE2155-4658-4D02-8319-6DF4106EA8CC}" srcOrd="1" destOrd="0" parTransId="{3724DD7C-05CC-4DEB-8DAD-8B592C981C96}" sibTransId="{632890C8-ECA2-44D8-9A94-863A64665BBC}"/>
     <dgm:cxn modelId="{959C0A07-B487-44FF-9CEB-B0B891D005B6}" type="presOf" srcId="{5BCD62D5-23CD-4A5A-A476-269CE76914DC}" destId="{43A2BA3D-20D2-4E5D-9CD2-B6EE3F312A3B}" srcOrd="0" destOrd="0" presId="urn:microsoft.com/office/officeart/2005/8/layout/cycle4"/>
-    <dgm:cxn modelId="{9BAD8EFF-9B32-4433-B605-9BFDB094AF74}" type="presOf" srcId="{989E09AB-A343-466C-BC14-C765FC9A1DD7}" destId="{38CD6BD6-D3E2-4B97-8665-48065905F491}" srcOrd="1" destOrd="1" presId="urn:microsoft.com/office/officeart/2005/8/layout/cycle4"/>
-    <dgm:cxn modelId="{EDDAA38D-6E30-4543-B0F1-EAA9A6A477C7}" srcId="{01A583E1-6537-45F8-AE09-C85491C9FC1D}" destId="{2D6962E4-72B9-4B1E-B258-246893A88E0D}" srcOrd="0" destOrd="0" parTransId="{5502C073-0884-4CFE-A849-62990833CEE5}" sibTransId="{0E9043AA-3D92-4FE3-8FA8-E174F20EB8FF}"/>
-    <dgm:cxn modelId="{4E151F0E-C99E-4BF4-81BC-837B231CBF92}" type="presOf" srcId="{2B41BF75-F5C8-4255-892F-6328E5A9E688}" destId="{4D58B8E3-ABF3-466F-BE72-A1334046C3F4}" srcOrd="0" destOrd="0" presId="urn:microsoft.com/office/officeart/2005/8/layout/cycle4"/>
-    <dgm:cxn modelId="{41218EDB-BD90-4410-89D0-F42795B77442}" type="presOf" srcId="{F9BE74C9-EC7E-4268-8C5A-882B3EFFF8FD}" destId="{809A40DB-630A-4CA0-804D-1A67767C019F}" srcOrd="0" destOrd="0" presId="urn:microsoft.com/office/officeart/2005/8/layout/cycle4"/>
-    <dgm:cxn modelId="{9BF38558-2481-46D5-AB3E-FC48BBE62666}" srcId="{F9BE74C9-EC7E-4268-8C5A-882B3EFFF8FD}" destId="{E5ACC793-F455-4177-B2A7-6FC33C9C1025}" srcOrd="3" destOrd="0" parTransId="{F3D91DD1-F12E-4C5D-82CF-86CF95B338AA}" sibTransId="{0E3913D7-3C7B-49AF-9134-A90315714B9E}"/>
-    <dgm:cxn modelId="{1695E917-4CB0-460A-9E6B-4DF46E74DE66}" type="presOf" srcId="{490168AD-E14E-4940-8CC2-7C35F66AB41B}" destId="{53094224-E102-4C09-9604-A3E90CFD0EB5}" srcOrd="0" destOrd="0" presId="urn:microsoft.com/office/officeart/2005/8/layout/cycle4"/>
-    <dgm:cxn modelId="{E4D73487-C5B1-4EB2-AF38-71DF0EBFDB67}" type="presOf" srcId="{7095E70B-7EFB-4733-BA44-C4BB0599979F}" destId="{4D58B8E3-ABF3-466F-BE72-A1334046C3F4}" srcOrd="0" destOrd="3" presId="urn:microsoft.com/office/officeart/2005/8/layout/cycle4"/>
-    <dgm:cxn modelId="{9991E351-28AB-47A6-8963-A9D299DB8675}" type="presOf" srcId="{989E09AB-A343-466C-BC14-C765FC9A1DD7}" destId="{4D58B8E3-ABF3-466F-BE72-A1334046C3F4}" srcOrd="0" destOrd="1" presId="urn:microsoft.com/office/officeart/2005/8/layout/cycle4"/>
-    <dgm:cxn modelId="{B55F96D7-8D63-46D6-833C-7BB32A8BF044}" type="presOf" srcId="{F8507812-6291-4C9B-AA0B-B8AF3A68427D}" destId="{C05EAFFC-2644-44E2-967D-B53235C71A38}" srcOrd="1" destOrd="2" presId="urn:microsoft.com/office/officeart/2005/8/layout/cycle4"/>
-    <dgm:cxn modelId="{4665B531-CE39-4D8D-9C92-1B0A97DBEF06}" srcId="{2BBE2155-4658-4D02-8319-6DF4106EA8CC}" destId="{490168AD-E14E-4940-8CC2-7C35F66AB41B}" srcOrd="0" destOrd="0" parTransId="{F8E86141-CA5C-4FD7-B090-BDC097EE9ED9}" sibTransId="{409F351B-3747-4E3C-89C6-F2C76F7C931A}"/>
     <dgm:cxn modelId="{2D68FBB9-2A3F-4DFB-9547-97148AD147B2}" srcId="{2D6962E4-72B9-4B1E-B258-246893A88E0D}" destId="{2B41BF75-F5C8-4255-892F-6328E5A9E688}" srcOrd="0" destOrd="0" parTransId="{36024776-6205-43C6-9331-B14C4C951E90}" sibTransId="{30E8B699-48A6-4778-A200-BCC2B91FEAE2}"/>
-    <dgm:cxn modelId="{6380C4C7-4EBB-43A2-9301-54A5C9841434}" type="presOf" srcId="{FAAD98B4-2CE9-4214-8BB6-F03CEEE572FF}" destId="{4D58B8E3-ABF3-466F-BE72-A1334046C3F4}" srcOrd="0" destOrd="2" presId="urn:microsoft.com/office/officeart/2005/8/layout/cycle4"/>
-    <dgm:cxn modelId="{DCB35549-6653-457E-A1A3-3F1DB9F48EB2}" srcId="{F9BE74C9-EC7E-4268-8C5A-882B3EFFF8FD}" destId="{F8507812-6291-4C9B-AA0B-B8AF3A68427D}" srcOrd="2" destOrd="0" parTransId="{4F2F02B6-C766-433A-873A-91091688269D}" sibTransId="{380A3AC5-BB38-4979-8AA3-011E077F4CA2}"/>
-    <dgm:cxn modelId="{1C4B7B5B-5A26-4FB7-B7A4-76D489C60865}" srcId="{2D6962E4-72B9-4B1E-B258-246893A88E0D}" destId="{FAAD98B4-2CE9-4214-8BB6-F03CEEE572FF}" srcOrd="2" destOrd="0" parTransId="{54D2E552-AFA4-449B-855C-8D07B27E44E2}" sibTransId="{CBB1F48E-041C-465A-B96F-A59A0B7362A5}"/>
-    <dgm:cxn modelId="{7F659E51-2E2F-40FF-9479-2FD7E732DF62}" type="presOf" srcId="{2D6962E4-72B9-4B1E-B258-246893A88E0D}" destId="{60DA8870-9857-4057-BC91-DD9B798F041F}" srcOrd="0" destOrd="0" presId="urn:microsoft.com/office/officeart/2005/8/layout/cycle4"/>
-    <dgm:cxn modelId="{0867E0A3-B749-4FC7-AFD8-611582642A56}" srcId="{5BCD62D5-23CD-4A5A-A476-269CE76914DC}" destId="{618CC25E-9050-4FB6-9F11-CAFC660578FC}" srcOrd="0" destOrd="0" parTransId="{892FDF72-278A-4E94-A52C-C9A43137F613}" sibTransId="{E48127D6-89B0-4F87-A1F9-517011A96A5B}"/>
-    <dgm:cxn modelId="{06428E54-26A5-4289-B287-166FC667611C}" type="presOf" srcId="{23580231-228D-4259-948C-ECAED9FB6BBD}" destId="{C05EAFFC-2644-44E2-967D-B53235C71A38}" srcOrd="1" destOrd="0" presId="urn:microsoft.com/office/officeart/2005/8/layout/cycle4"/>
-    <dgm:cxn modelId="{784002D3-341F-4DF0-9345-0B1634589798}" type="presOf" srcId="{2B41BF75-F5C8-4255-892F-6328E5A9E688}" destId="{38CD6BD6-D3E2-4B97-8665-48065905F491}" srcOrd="1" destOrd="0" presId="urn:microsoft.com/office/officeart/2005/8/layout/cycle4"/>
     <dgm:cxn modelId="{6CB06391-8FCA-448A-8A60-52478AAD6079}" type="presParOf" srcId="{9D4C7C9D-7ED1-464F-941B-21AB88CE8789}" destId="{498B1DD5-D2B2-4A70-BAF8-2672572231DA}" srcOrd="0" destOrd="0" presId="urn:microsoft.com/office/officeart/2005/8/layout/cycle4"/>
     <dgm:cxn modelId="{679C53C4-692C-4A8B-8F09-403299CC720A}" type="presParOf" srcId="{498B1DD5-D2B2-4A70-BAF8-2672572231DA}" destId="{D2CA330A-D99A-4389-8F73-7FE17A382E6E}" srcOrd="0" destOrd="0" presId="urn:microsoft.com/office/officeart/2005/8/layout/cycle4"/>
     <dgm:cxn modelId="{0B328022-04B0-4938-A986-5A44F6E51B41}" type="presParOf" srcId="{D2CA330A-D99A-4389-8F73-7FE17A382E6E}" destId="{4D58B8E3-ABF3-466F-BE72-A1334046C3F4}" srcOrd="0" destOrd="0" presId="urn:microsoft.com/office/officeart/2005/8/layout/cycle4"/>
@@ -17777,13 +17799,13 @@
   <p:clrMapOvr>
     <a:masterClrMapping/>
   </p:clrMapOvr>
-  <mc:AlternateContent xmlns:mc="http://schemas.openxmlformats.org/markup-compatibility/2006">
-    <mc:Choice xmlns:p14="http://schemas.microsoft.com/office/powerpoint/2010/main" Requires="p14">
+  <mc:AlternateContent xmlns:mc="http://schemas.openxmlformats.org/markup-compatibility/2006" xmlns:p14="http://schemas.microsoft.com/office/powerpoint/2010/main">
+    <mc:Choice Requires="p14">
       <p:transition spd="med" p14:dur="700">
         <p:fade/>
       </p:transition>
     </mc:Choice>
-    <mc:Fallback>
+    <mc:Fallback xmlns="">
       <p:transition spd="med">
         <p:fade/>
       </p:transition>
@@ -18062,13 +18084,13 @@
   <p:clrMapOvr>
     <a:masterClrMapping/>
   </p:clrMapOvr>
-  <mc:AlternateContent xmlns:mc="http://schemas.openxmlformats.org/markup-compatibility/2006">
-    <mc:Choice xmlns:p14="http://schemas.microsoft.com/office/powerpoint/2010/main" Requires="p14">
+  <mc:AlternateContent xmlns:mc="http://schemas.openxmlformats.org/markup-compatibility/2006" xmlns:p14="http://schemas.microsoft.com/office/powerpoint/2010/main">
+    <mc:Choice Requires="p14">
       <p:transition spd="med" p14:dur="700">
         <p:fade/>
       </p:transition>
     </mc:Choice>
-    <mc:Fallback>
+    <mc:Fallback xmlns="">
       <p:transition spd="med">
         <p:fade/>
       </p:transition>
@@ -20077,6 +20099,111 @@
         </p:nvSpPr>
         <p:spPr>
           <a:xfrm>
+            <a:off x="838200" y="365125"/>
+            <a:ext cx="10515600" cy="859617"/>
+          </a:xfrm>
+        </p:spPr>
+        <p:txBody>
+          <a:bodyPr/>
+          <a:lstStyle/>
+          <a:p>
+            <a:pPr algn="ctr"/>
+            <a:r>
+              <a:rPr lang="ru-RU" b="1" dirty="0" smtClean="0">
+                <a:solidFill>
+                  <a:srgbClr val="FFFFFF"/>
+                </a:solidFill>
+              </a:rPr>
+              <a:t>Статистика</a:t>
+            </a:r>
+            <a:endParaRPr lang="ru-RU" b="1" dirty="0">
+              <a:solidFill>
+                <a:srgbClr val="FFFFFF"/>
+              </a:solidFill>
+            </a:endParaRPr>
+          </a:p>
+        </p:txBody>
+      </p:sp>
+      <p:sp>
+        <p:nvSpPr>
+          <p:cNvPr id="3" name="Объект 2"/>
+          <p:cNvSpPr>
+            <a:spLocks noGrp="1"/>
+          </p:cNvSpPr>
+          <p:nvPr>
+            <p:ph idx="1"/>
+          </p:nvPr>
+        </p:nvSpPr>
+        <p:spPr/>
+        <p:txBody>
+          <a:bodyPr/>
+          <a:lstStyle/>
+          <a:p>
+            <a:endParaRPr lang="ru-RU" dirty="0"/>
+          </a:p>
+        </p:txBody>
+      </p:sp>
+    </p:spTree>
+    <p:extLst>
+      <p:ext uri="{BB962C8B-B14F-4D97-AF65-F5344CB8AC3E}">
+        <p14:creationId xmlns:p14="http://schemas.microsoft.com/office/powerpoint/2010/main" val="2265040254"/>
+      </p:ext>
+    </p:extLst>
+  </p:cSld>
+  <p:clrMapOvr>
+    <a:masterClrMapping/>
+  </p:clrMapOvr>
+  <mc:AlternateContent xmlns:mc="http://schemas.openxmlformats.org/markup-compatibility/2006" xmlns:p14="http://schemas.microsoft.com/office/powerpoint/2010/main">
+    <mc:Choice Requires="p14">
+      <p:transition spd="med" p14:dur="700">
+        <p:fade/>
+      </p:transition>
+    </mc:Choice>
+    <mc:Fallback xmlns="">
+      <p:transition spd="med">
+        <p:fade/>
+      </p:transition>
+    </mc:Fallback>
+  </mc:AlternateContent>
+  <p:timing>
+    <p:tnLst>
+      <p:par>
+        <p:cTn id="1" dur="indefinite" restart="never" nodeType="tmRoot"/>
+      </p:par>
+    </p:tnLst>
+  </p:timing>
+</p:sld>
+</file>
+
+<file path=ppt/slides/slide17.xml><?xml version="1.0" encoding="utf-8"?>
+<p:sld xmlns:a="http://schemas.openxmlformats.org/drawingml/2006/main" xmlns:r="http://schemas.openxmlformats.org/officeDocument/2006/relationships" xmlns:p="http://schemas.openxmlformats.org/presentationml/2006/main">
+  <p:cSld>
+    <p:spTree>
+      <p:nvGrpSpPr>
+        <p:cNvPr id="1" name=""/>
+        <p:cNvGrpSpPr/>
+        <p:nvPr/>
+      </p:nvGrpSpPr>
+      <p:grpSpPr>
+        <a:xfrm>
+          <a:off x="0" y="0"/>
+          <a:ext cx="0" cy="0"/>
+          <a:chOff x="0" y="0"/>
+          <a:chExt cx="0" cy="0"/>
+        </a:xfrm>
+      </p:grpSpPr>
+      <p:sp>
+        <p:nvSpPr>
+          <p:cNvPr id="2" name="Заголовок 1"/>
+          <p:cNvSpPr>
+            <a:spLocks noGrp="1"/>
+          </p:cNvSpPr>
+          <p:nvPr>
+            <p:ph type="title"/>
+          </p:nvPr>
+        </p:nvSpPr>
+        <p:spPr>
+          <a:xfrm>
             <a:off x="839788" y="365126"/>
             <a:ext cx="10515600" cy="880668"/>
           </a:xfrm>
@@ -20274,111 +20401,6 @@
       </p:transition>
     </mc:Choice>
     <mc:Fallback xmlns="">
-      <p:transition spd="med">
-        <p:fade/>
-      </p:transition>
-    </mc:Fallback>
-  </mc:AlternateContent>
-  <p:timing>
-    <p:tnLst>
-      <p:par>
-        <p:cTn id="1" dur="indefinite" restart="never" nodeType="tmRoot"/>
-      </p:par>
-    </p:tnLst>
-  </p:timing>
-</p:sld>
-</file>
-
-<file path=ppt/slides/slide17.xml><?xml version="1.0" encoding="utf-8"?>
-<p:sld xmlns:a="http://schemas.openxmlformats.org/drawingml/2006/main" xmlns:r="http://schemas.openxmlformats.org/officeDocument/2006/relationships" xmlns:p="http://schemas.openxmlformats.org/presentationml/2006/main">
-  <p:cSld>
-    <p:spTree>
-      <p:nvGrpSpPr>
-        <p:cNvPr id="1" name=""/>
-        <p:cNvGrpSpPr/>
-        <p:nvPr/>
-      </p:nvGrpSpPr>
-      <p:grpSpPr>
-        <a:xfrm>
-          <a:off x="0" y="0"/>
-          <a:ext cx="0" cy="0"/>
-          <a:chOff x="0" y="0"/>
-          <a:chExt cx="0" cy="0"/>
-        </a:xfrm>
-      </p:grpSpPr>
-      <p:sp>
-        <p:nvSpPr>
-          <p:cNvPr id="2" name="Заголовок 1"/>
-          <p:cNvSpPr>
-            <a:spLocks noGrp="1"/>
-          </p:cNvSpPr>
-          <p:nvPr>
-            <p:ph type="title"/>
-          </p:nvPr>
-        </p:nvSpPr>
-        <p:spPr>
-          <a:xfrm>
-            <a:off x="838200" y="365125"/>
-            <a:ext cx="10515600" cy="859617"/>
-          </a:xfrm>
-        </p:spPr>
-        <p:txBody>
-          <a:bodyPr/>
-          <a:lstStyle/>
-          <a:p>
-            <a:pPr algn="ctr"/>
-            <a:r>
-              <a:rPr lang="ru-RU" b="1" dirty="0" smtClean="0">
-                <a:solidFill>
-                  <a:srgbClr val="FFFFFF"/>
-                </a:solidFill>
-              </a:rPr>
-              <a:t>Статистика</a:t>
-            </a:r>
-            <a:endParaRPr lang="ru-RU" b="1" dirty="0">
-              <a:solidFill>
-                <a:srgbClr val="FFFFFF"/>
-              </a:solidFill>
-            </a:endParaRPr>
-          </a:p>
-        </p:txBody>
-      </p:sp>
-      <p:sp>
-        <p:nvSpPr>
-          <p:cNvPr id="3" name="Объект 2"/>
-          <p:cNvSpPr>
-            <a:spLocks noGrp="1"/>
-          </p:cNvSpPr>
-          <p:nvPr>
-            <p:ph idx="1"/>
-          </p:nvPr>
-        </p:nvSpPr>
-        <p:spPr/>
-        <p:txBody>
-          <a:bodyPr/>
-          <a:lstStyle/>
-          <a:p>
-            <a:endParaRPr lang="ru-RU" dirty="0"/>
-          </a:p>
-        </p:txBody>
-      </p:sp>
-    </p:spTree>
-    <p:extLst>
-      <p:ext uri="{BB962C8B-B14F-4D97-AF65-F5344CB8AC3E}">
-        <p14:creationId xmlns:p14="http://schemas.microsoft.com/office/powerpoint/2010/main" val="2265040254"/>
-      </p:ext>
-    </p:extLst>
-  </p:cSld>
-  <p:clrMapOvr>
-    <a:masterClrMapping/>
-  </p:clrMapOvr>
-  <mc:AlternateContent xmlns:mc="http://schemas.openxmlformats.org/markup-compatibility/2006">
-    <mc:Choice xmlns:p14="http://schemas.microsoft.com/office/powerpoint/2010/main" Requires="p14">
-      <p:transition spd="med" p14:dur="700">
-        <p:fade/>
-      </p:transition>
-    </mc:Choice>
-    <mc:Fallback>
       <p:transition spd="med">
         <p:fade/>
       </p:transition>
@@ -23382,7 +23404,7 @@
           <p:nvPr>
             <p:extLst>
               <p:ext uri="{D42A27DB-BD31-4B8C-83A1-F6EECF244321}">
-                <p14:modId xmlns:p14="http://schemas.microsoft.com/office/powerpoint/2010/main" val="177263144"/>
+                <p14:modId xmlns:p14="http://schemas.microsoft.com/office/powerpoint/2010/main" val="253131001"/>
               </p:ext>
             </p:extLst>
           </p:nvPr>

</xml_diff>